<commit_message>
Refactored the view model from ImageSliderViewModel to a generic LibraryEditorViewModel. This can be configured to load images into an image slider view, but it could also be used with any other document library, with say a quick edit table view.
</commit_message>
<xml_diff>
--- a/TKOSharePoint_SPSChicago.pptx
+++ b/TKOSharePoint_SPSChicago.pptx
@@ -6305,232 +6305,6 @@
       <dsp:cNvGrpSpPr/>
     </dsp:nvGrpSpPr>
     <dsp:grpSpPr/>
-    <dsp:sp modelId="{8EE0EFBD-DF3A-4292-9159-0A070DC220D5}">
-      <dsp:nvSpPr>
-        <dsp:cNvPr id="0" name=""/>
-        <dsp:cNvSpPr/>
-      </dsp:nvSpPr>
-      <dsp:spPr>
-        <a:xfrm>
-          <a:off x="0" y="6062"/>
-          <a:ext cx="9160125" cy="1175264"/>
-        </a:xfrm>
-        <a:prstGeom prst="roundRect">
-          <a:avLst/>
-        </a:prstGeom>
-        <a:solidFill>
-          <a:schemeClr val="accent2">
-            <a:lumMod val="75000"/>
-          </a:schemeClr>
-        </a:solidFill>
-        <a:ln w="12700" cap="flat" cmpd="sng" algn="ctr">
-          <a:solidFill>
-            <a:schemeClr val="lt1">
-              <a:hueOff val="0"/>
-              <a:satOff val="0"/>
-              <a:lumOff val="0"/>
-              <a:alphaOff val="0"/>
-            </a:schemeClr>
-          </a:solidFill>
-          <a:prstDash val="solid"/>
-          <a:miter lim="800000"/>
-        </a:ln>
-        <a:effectLst/>
-      </dsp:spPr>
-      <dsp:style>
-        <a:lnRef idx="2">
-          <a:scrgbClr r="0" g="0" b="0"/>
-        </a:lnRef>
-        <a:fillRef idx="1">
-          <a:scrgbClr r="0" g="0" b="0"/>
-        </a:fillRef>
-        <a:effectRef idx="0">
-          <a:scrgbClr r="0" g="0" b="0"/>
-        </a:effectRef>
-        <a:fontRef idx="minor">
-          <a:schemeClr val="lt1"/>
-        </a:fontRef>
-      </dsp:style>
-      <dsp:txBody>
-        <a:bodyPr spcFirstLastPara="0" vert="horz" wrap="square" lIns="186690" tIns="186690" rIns="186690" bIns="186690" numCol="1" spcCol="1270" anchor="ctr" anchorCtr="0">
-          <a:noAutofit/>
-        </a:bodyPr>
-        <a:lstStyle/>
-        <a:p>
-          <a:pPr lvl="0" algn="l" defTabSz="2178050">
-            <a:lnSpc>
-              <a:spcPct val="90000"/>
-            </a:lnSpc>
-            <a:spcBef>
-              <a:spcPct val="0"/>
-            </a:spcBef>
-            <a:spcAft>
-              <a:spcPct val="35000"/>
-            </a:spcAft>
-          </a:pPr>
-          <a:r>
-            <a:rPr lang="en-US" sz="4900" b="1" kern="1200" dirty="0"/>
-            <a:t>Talk a little about Typescript</a:t>
-          </a:r>
-          <a:endParaRPr lang="en-US" sz="4900" kern="1200" dirty="0"/>
-        </a:p>
-      </dsp:txBody>
-      <dsp:txXfrm>
-        <a:off x="57372" y="63434"/>
-        <a:ext cx="9045381" cy="1060520"/>
-      </dsp:txXfrm>
-    </dsp:sp>
-    <dsp:sp modelId="{216244C1-D423-4173-8449-237AEB57C120}">
-      <dsp:nvSpPr>
-        <dsp:cNvPr id="0" name=""/>
-        <dsp:cNvSpPr/>
-      </dsp:nvSpPr>
-      <dsp:spPr>
-        <a:xfrm>
-          <a:off x="0" y="1322447"/>
-          <a:ext cx="9160125" cy="1175264"/>
-        </a:xfrm>
-        <a:prstGeom prst="roundRect">
-          <a:avLst/>
-        </a:prstGeom>
-        <a:solidFill>
-          <a:schemeClr val="accent6"/>
-        </a:solidFill>
-        <a:ln w="12700" cap="flat" cmpd="sng" algn="ctr">
-          <a:solidFill>
-            <a:schemeClr val="lt1">
-              <a:hueOff val="0"/>
-              <a:satOff val="0"/>
-              <a:lumOff val="0"/>
-              <a:alphaOff val="0"/>
-            </a:schemeClr>
-          </a:solidFill>
-          <a:prstDash val="solid"/>
-          <a:miter lim="800000"/>
-        </a:ln>
-        <a:effectLst/>
-      </dsp:spPr>
-      <dsp:style>
-        <a:lnRef idx="2">
-          <a:scrgbClr r="0" g="0" b="0"/>
-        </a:lnRef>
-        <a:fillRef idx="1">
-          <a:scrgbClr r="0" g="0" b="0"/>
-        </a:fillRef>
-        <a:effectRef idx="0">
-          <a:scrgbClr r="0" g="0" b="0"/>
-        </a:effectRef>
-        <a:fontRef idx="minor">
-          <a:schemeClr val="lt1"/>
-        </a:fontRef>
-      </dsp:style>
-      <dsp:txBody>
-        <a:bodyPr spcFirstLastPara="0" vert="horz" wrap="square" lIns="186690" tIns="186690" rIns="186690" bIns="186690" numCol="1" spcCol="1270" anchor="ctr" anchorCtr="0">
-          <a:noAutofit/>
-        </a:bodyPr>
-        <a:lstStyle/>
-        <a:p>
-          <a:pPr lvl="0" algn="l" defTabSz="2178050">
-            <a:lnSpc>
-              <a:spcPct val="90000"/>
-            </a:lnSpc>
-            <a:spcBef>
-              <a:spcPct val="0"/>
-            </a:spcBef>
-            <a:spcAft>
-              <a:spcPct val="35000"/>
-            </a:spcAft>
-          </a:pPr>
-          <a:r>
-            <a:rPr lang="en-US" sz="4900" b="1" kern="1200" dirty="0"/>
-            <a:t>Talk a little about Knockout</a:t>
-          </a:r>
-          <a:endParaRPr lang="en-US" sz="4900" kern="1200" dirty="0"/>
-        </a:p>
-      </dsp:txBody>
-      <dsp:txXfrm>
-        <a:off x="57372" y="1379819"/>
-        <a:ext cx="9045381" cy="1060520"/>
-      </dsp:txXfrm>
-    </dsp:sp>
-    <dsp:sp modelId="{E5CF1062-7797-44A6-AF37-05701425EF43}">
-      <dsp:nvSpPr>
-        <dsp:cNvPr id="0" name=""/>
-        <dsp:cNvSpPr/>
-      </dsp:nvSpPr>
-      <dsp:spPr>
-        <a:xfrm>
-          <a:off x="0" y="2638832"/>
-          <a:ext cx="9160125" cy="1175264"/>
-        </a:xfrm>
-        <a:prstGeom prst="roundRect">
-          <a:avLst/>
-        </a:prstGeom>
-        <a:solidFill>
-          <a:schemeClr val="accent1">
-            <a:hueOff val="0"/>
-            <a:satOff val="0"/>
-            <a:lumOff val="0"/>
-            <a:alphaOff val="0"/>
-          </a:schemeClr>
-        </a:solidFill>
-        <a:ln w="12700" cap="flat" cmpd="sng" algn="ctr">
-          <a:solidFill>
-            <a:schemeClr val="lt1">
-              <a:hueOff val="0"/>
-              <a:satOff val="0"/>
-              <a:lumOff val="0"/>
-              <a:alphaOff val="0"/>
-            </a:schemeClr>
-          </a:solidFill>
-          <a:prstDash val="solid"/>
-          <a:miter lim="800000"/>
-        </a:ln>
-        <a:effectLst/>
-      </dsp:spPr>
-      <dsp:style>
-        <a:lnRef idx="2">
-          <a:scrgbClr r="0" g="0" b="0"/>
-        </a:lnRef>
-        <a:fillRef idx="1">
-          <a:scrgbClr r="0" g="0" b="0"/>
-        </a:fillRef>
-        <a:effectRef idx="0">
-          <a:scrgbClr r="0" g="0" b="0"/>
-        </a:effectRef>
-        <a:fontRef idx="minor">
-          <a:schemeClr val="lt1"/>
-        </a:fontRef>
-      </dsp:style>
-      <dsp:txBody>
-        <a:bodyPr spcFirstLastPara="0" vert="horz" wrap="square" lIns="186690" tIns="186690" rIns="186690" bIns="186690" numCol="1" spcCol="1270" anchor="ctr" anchorCtr="0">
-          <a:noAutofit/>
-        </a:bodyPr>
-        <a:lstStyle/>
-        <a:p>
-          <a:pPr lvl="0" algn="l" defTabSz="2178050">
-            <a:lnSpc>
-              <a:spcPct val="90000"/>
-            </a:lnSpc>
-            <a:spcBef>
-              <a:spcPct val="0"/>
-            </a:spcBef>
-            <a:spcAft>
-              <a:spcPct val="35000"/>
-            </a:spcAft>
-          </a:pPr>
-          <a:r>
-            <a:rPr lang="en-US" sz="4900" b="1" kern="1200" dirty="0"/>
-            <a:t>Demo using them in SharePoint</a:t>
-          </a:r>
-          <a:endParaRPr lang="en-US" sz="4900" kern="1200" dirty="0"/>
-        </a:p>
-      </dsp:txBody>
-      <dsp:txXfrm>
-        <a:off x="57372" y="2696204"/>
-        <a:ext cx="9045381" cy="1060520"/>
-      </dsp:txXfrm>
-    </dsp:sp>
   </dsp:spTree>
 </dsp:drawing>
 </file>
@@ -6543,237 +6317,6 @@
       <dsp:cNvGrpSpPr/>
     </dsp:nvGrpSpPr>
     <dsp:grpSpPr/>
-    <dsp:sp modelId="{2C19A970-0289-4F66-89A8-EFF6EF1A4264}">
-      <dsp:nvSpPr>
-        <dsp:cNvPr id="0" name=""/>
-        <dsp:cNvSpPr/>
-      </dsp:nvSpPr>
-      <dsp:spPr>
-        <a:xfrm>
-          <a:off x="443083" y="543996"/>
-          <a:ext cx="4572002" cy="1402286"/>
-        </a:xfrm>
-        <a:prstGeom prst="roundRect">
-          <a:avLst/>
-        </a:prstGeom>
-        <a:solidFill>
-          <a:schemeClr val="accent1">
-            <a:hueOff val="0"/>
-            <a:satOff val="0"/>
-            <a:lumOff val="0"/>
-            <a:alphaOff val="0"/>
-          </a:schemeClr>
-        </a:solidFill>
-        <a:ln w="12700" cap="flat" cmpd="sng" algn="ctr">
-          <a:solidFill>
-            <a:schemeClr val="lt1">
-              <a:hueOff val="0"/>
-              <a:satOff val="0"/>
-              <a:lumOff val="0"/>
-              <a:alphaOff val="0"/>
-            </a:schemeClr>
-          </a:solidFill>
-          <a:prstDash val="solid"/>
-          <a:miter lim="800000"/>
-        </a:ln>
-        <a:effectLst/>
-      </dsp:spPr>
-      <dsp:style>
-        <a:lnRef idx="2">
-          <a:scrgbClr r="0" g="0" b="0"/>
-        </a:lnRef>
-        <a:fillRef idx="1">
-          <a:scrgbClr r="0" g="0" b="0"/>
-        </a:fillRef>
-        <a:effectRef idx="0">
-          <a:scrgbClr r="0" g="0" b="0"/>
-        </a:effectRef>
-        <a:fontRef idx="minor">
-          <a:schemeClr val="lt1"/>
-        </a:fontRef>
-      </dsp:style>
-      <dsp:txBody>
-        <a:bodyPr spcFirstLastPara="0" vert="horz" wrap="square" lIns="148590" tIns="74295" rIns="148590" bIns="74295" numCol="1" spcCol="1270" anchor="ctr" anchorCtr="0">
-          <a:noAutofit/>
-        </a:bodyPr>
-        <a:lstStyle/>
-        <a:p>
-          <a:pPr lvl="0" algn="ctr" defTabSz="1733550" rtl="0">
-            <a:lnSpc>
-              <a:spcPct val="90000"/>
-            </a:lnSpc>
-            <a:spcBef>
-              <a:spcPct val="0"/>
-            </a:spcBef>
-            <a:spcAft>
-              <a:spcPct val="35000"/>
-            </a:spcAft>
-          </a:pPr>
-          <a:r>
-            <a:rPr lang="en-US" sz="3900" kern="1200" dirty="0"/>
-            <a:t>Strongly typed JavaScript</a:t>
-          </a:r>
-        </a:p>
-      </dsp:txBody>
-      <dsp:txXfrm>
-        <a:off x="511537" y="612450"/>
-        <a:ext cx="4435094" cy="1265378"/>
-      </dsp:txXfrm>
-    </dsp:sp>
-    <dsp:sp modelId="{78D863EE-3D5F-4FA9-9867-B480DE92A514}">
-      <dsp:nvSpPr>
-        <dsp:cNvPr id="0" name=""/>
-        <dsp:cNvSpPr/>
-      </dsp:nvSpPr>
-      <dsp:spPr>
-        <a:xfrm>
-          <a:off x="5127972" y="548834"/>
-          <a:ext cx="4572002" cy="1402286"/>
-        </a:xfrm>
-        <a:prstGeom prst="roundRect">
-          <a:avLst/>
-        </a:prstGeom>
-        <a:solidFill>
-          <a:schemeClr val="accent1">
-            <a:hueOff val="0"/>
-            <a:satOff val="0"/>
-            <a:lumOff val="0"/>
-            <a:alphaOff val="0"/>
-          </a:schemeClr>
-        </a:solidFill>
-        <a:ln w="12700" cap="flat" cmpd="sng" algn="ctr">
-          <a:solidFill>
-            <a:schemeClr val="lt1">
-              <a:hueOff val="0"/>
-              <a:satOff val="0"/>
-              <a:lumOff val="0"/>
-              <a:alphaOff val="0"/>
-            </a:schemeClr>
-          </a:solidFill>
-          <a:prstDash val="solid"/>
-          <a:miter lim="800000"/>
-        </a:ln>
-        <a:effectLst/>
-      </dsp:spPr>
-      <dsp:style>
-        <a:lnRef idx="2">
-          <a:scrgbClr r="0" g="0" b="0"/>
-        </a:lnRef>
-        <a:fillRef idx="1">
-          <a:scrgbClr r="0" g="0" b="0"/>
-        </a:fillRef>
-        <a:effectRef idx="0">
-          <a:scrgbClr r="0" g="0" b="0"/>
-        </a:effectRef>
-        <a:fontRef idx="minor">
-          <a:schemeClr val="lt1"/>
-        </a:fontRef>
-      </dsp:style>
-      <dsp:txBody>
-        <a:bodyPr spcFirstLastPara="0" vert="horz" wrap="square" lIns="148590" tIns="74295" rIns="148590" bIns="74295" numCol="1" spcCol="1270" anchor="ctr" anchorCtr="0">
-          <a:noAutofit/>
-        </a:bodyPr>
-        <a:lstStyle/>
-        <a:p>
-          <a:pPr lvl="0" algn="ctr" defTabSz="1733550" rtl="0">
-            <a:lnSpc>
-              <a:spcPct val="90000"/>
-            </a:lnSpc>
-            <a:spcBef>
-              <a:spcPct val="0"/>
-            </a:spcBef>
-            <a:spcAft>
-              <a:spcPct val="35000"/>
-            </a:spcAft>
-          </a:pPr>
-          <a:r>
-            <a:rPr lang="en-US" sz="3900" kern="1200" dirty="0"/>
-            <a:t>Adds Classes, Interfaces, Modules</a:t>
-          </a:r>
-        </a:p>
-      </dsp:txBody>
-      <dsp:txXfrm>
-        <a:off x="5196426" y="617288"/>
-        <a:ext cx="4435094" cy="1265378"/>
-      </dsp:txXfrm>
-    </dsp:sp>
-    <dsp:sp modelId="{B803BD96-31F3-4D11-9283-4A1DB5B9DE28}">
-      <dsp:nvSpPr>
-        <dsp:cNvPr id="0" name=""/>
-        <dsp:cNvSpPr/>
-      </dsp:nvSpPr>
-      <dsp:spPr>
-        <a:xfrm>
-          <a:off x="2757305" y="2224440"/>
-          <a:ext cx="4572002" cy="1402286"/>
-        </a:xfrm>
-        <a:prstGeom prst="roundRect">
-          <a:avLst/>
-        </a:prstGeom>
-        <a:solidFill>
-          <a:schemeClr val="accent1">
-            <a:hueOff val="0"/>
-            <a:satOff val="0"/>
-            <a:lumOff val="0"/>
-            <a:alphaOff val="0"/>
-          </a:schemeClr>
-        </a:solidFill>
-        <a:ln w="12700" cap="flat" cmpd="sng" algn="ctr">
-          <a:solidFill>
-            <a:schemeClr val="lt1">
-              <a:hueOff val="0"/>
-              <a:satOff val="0"/>
-              <a:lumOff val="0"/>
-              <a:alphaOff val="0"/>
-            </a:schemeClr>
-          </a:solidFill>
-          <a:prstDash val="solid"/>
-          <a:miter lim="800000"/>
-        </a:ln>
-        <a:effectLst/>
-      </dsp:spPr>
-      <dsp:style>
-        <a:lnRef idx="2">
-          <a:scrgbClr r="0" g="0" b="0"/>
-        </a:lnRef>
-        <a:fillRef idx="1">
-          <a:scrgbClr r="0" g="0" b="0"/>
-        </a:fillRef>
-        <a:effectRef idx="0">
-          <a:scrgbClr r="0" g="0" b="0"/>
-        </a:effectRef>
-        <a:fontRef idx="minor">
-          <a:schemeClr val="lt1"/>
-        </a:fontRef>
-      </dsp:style>
-      <dsp:txBody>
-        <a:bodyPr spcFirstLastPara="0" vert="horz" wrap="square" lIns="148590" tIns="74295" rIns="148590" bIns="74295" numCol="1" spcCol="1270" anchor="ctr" anchorCtr="0">
-          <a:noAutofit/>
-        </a:bodyPr>
-        <a:lstStyle/>
-        <a:p>
-          <a:pPr lvl="0" algn="ctr" defTabSz="1733550" rtl="0">
-            <a:lnSpc>
-              <a:spcPct val="90000"/>
-            </a:lnSpc>
-            <a:spcBef>
-              <a:spcPct val="0"/>
-            </a:spcBef>
-            <a:spcAft>
-              <a:spcPct val="35000"/>
-            </a:spcAft>
-          </a:pPr>
-          <a:r>
-            <a:rPr lang="en-US" sz="3900" kern="1200" dirty="0"/>
-            <a:t>Superset of JavaScript</a:t>
-          </a:r>
-        </a:p>
-      </dsp:txBody>
-      <dsp:txXfrm>
-        <a:off x="2825759" y="2292894"/>
-        <a:ext cx="4435094" cy="1265378"/>
-      </dsp:txXfrm>
-    </dsp:sp>
   </dsp:spTree>
 </dsp:drawing>
 </file>
@@ -6786,331 +6329,6 @@
       <dsp:cNvGrpSpPr/>
     </dsp:nvGrpSpPr>
     <dsp:grpSpPr/>
-    <dsp:sp modelId="{E2D29A80-DFF9-42D5-8321-575EC58CC7A6}">
-      <dsp:nvSpPr>
-        <dsp:cNvPr id="0" name=""/>
-        <dsp:cNvSpPr/>
-      </dsp:nvSpPr>
-      <dsp:spPr>
-        <a:xfrm>
-          <a:off x="1671988" y="0"/>
-          <a:ext cx="4916666" cy="4916666"/>
-        </a:xfrm>
-        <a:prstGeom prst="diamond">
-          <a:avLst/>
-        </a:prstGeom>
-        <a:noFill/>
-        <a:ln>
-          <a:noFill/>
-        </a:ln>
-        <a:effectLst/>
-      </dsp:spPr>
-      <dsp:style>
-        <a:lnRef idx="0">
-          <a:scrgbClr r="0" g="0" b="0"/>
-        </a:lnRef>
-        <a:fillRef idx="1">
-          <a:scrgbClr r="0" g="0" b="0"/>
-        </a:fillRef>
-        <a:effectRef idx="0">
-          <a:scrgbClr r="0" g="0" b="0"/>
-        </a:effectRef>
-        <a:fontRef idx="minor"/>
-      </dsp:style>
-    </dsp:sp>
-    <dsp:sp modelId="{C14930DF-CE5D-439B-A21A-A81E31A88005}">
-      <dsp:nvSpPr>
-        <dsp:cNvPr id="0" name=""/>
-        <dsp:cNvSpPr/>
-      </dsp:nvSpPr>
-      <dsp:spPr>
-        <a:xfrm>
-          <a:off x="374895" y="458262"/>
-          <a:ext cx="3657592" cy="1917499"/>
-        </a:xfrm>
-        <a:prstGeom prst="roundRect">
-          <a:avLst/>
-        </a:prstGeom>
-        <a:solidFill>
-          <a:schemeClr val="accent6"/>
-        </a:solidFill>
-        <a:ln w="12700" cap="flat" cmpd="sng" algn="ctr">
-          <a:solidFill>
-            <a:schemeClr val="lt1">
-              <a:hueOff val="0"/>
-              <a:satOff val="0"/>
-              <a:lumOff val="0"/>
-              <a:alphaOff val="0"/>
-            </a:schemeClr>
-          </a:solidFill>
-          <a:prstDash val="solid"/>
-          <a:miter lim="800000"/>
-        </a:ln>
-        <a:effectLst/>
-      </dsp:spPr>
-      <dsp:style>
-        <a:lnRef idx="2">
-          <a:scrgbClr r="0" g="0" b="0"/>
-        </a:lnRef>
-        <a:fillRef idx="1">
-          <a:scrgbClr r="0" g="0" b="0"/>
-        </a:fillRef>
-        <a:effectRef idx="0">
-          <a:scrgbClr r="0" g="0" b="0"/>
-        </a:effectRef>
-        <a:fontRef idx="minor">
-          <a:schemeClr val="lt1"/>
-        </a:fontRef>
-      </dsp:style>
-      <dsp:txBody>
-        <a:bodyPr spcFirstLastPara="0" vert="horz" wrap="square" lIns="118110" tIns="118110" rIns="118110" bIns="118110" numCol="1" spcCol="1270" anchor="ctr" anchorCtr="0">
-          <a:noAutofit/>
-        </a:bodyPr>
-        <a:lstStyle/>
-        <a:p>
-          <a:pPr lvl="0" algn="ctr" defTabSz="1377950" rtl="0">
-            <a:lnSpc>
-              <a:spcPct val="90000"/>
-            </a:lnSpc>
-            <a:spcBef>
-              <a:spcPct val="0"/>
-            </a:spcBef>
-            <a:spcAft>
-              <a:spcPct val="35000"/>
-            </a:spcAft>
-          </a:pPr>
-          <a:r>
-            <a:rPr lang="en-US" sz="3100" kern="1200" dirty="0"/>
-            <a:t>Easier transition for server-side developers</a:t>
-          </a:r>
-        </a:p>
-      </dsp:txBody>
-      <dsp:txXfrm>
-        <a:off x="468500" y="551867"/>
-        <a:ext cx="3470382" cy="1730289"/>
-      </dsp:txXfrm>
-    </dsp:sp>
-    <dsp:sp modelId="{DC38BAFD-3BF8-4B40-8F7A-81DAB0CC4FB6}">
-      <dsp:nvSpPr>
-        <dsp:cNvPr id="0" name=""/>
-        <dsp:cNvSpPr/>
-      </dsp:nvSpPr>
-      <dsp:spPr>
-        <a:xfrm>
-          <a:off x="4306830" y="460947"/>
-          <a:ext cx="3657592" cy="1917499"/>
-        </a:xfrm>
-        <a:prstGeom prst="roundRect">
-          <a:avLst/>
-        </a:prstGeom>
-        <a:solidFill>
-          <a:schemeClr val="accent1">
-            <a:lumMod val="60000"/>
-            <a:lumOff val="40000"/>
-          </a:schemeClr>
-        </a:solidFill>
-        <a:ln w="12700" cap="flat" cmpd="sng" algn="ctr">
-          <a:solidFill>
-            <a:schemeClr val="lt1">
-              <a:hueOff val="0"/>
-              <a:satOff val="0"/>
-              <a:lumOff val="0"/>
-              <a:alphaOff val="0"/>
-            </a:schemeClr>
-          </a:solidFill>
-          <a:prstDash val="solid"/>
-          <a:miter lim="800000"/>
-        </a:ln>
-        <a:effectLst/>
-      </dsp:spPr>
-      <dsp:style>
-        <a:lnRef idx="2">
-          <a:scrgbClr r="0" g="0" b="0"/>
-        </a:lnRef>
-        <a:fillRef idx="1">
-          <a:scrgbClr r="0" g="0" b="0"/>
-        </a:fillRef>
-        <a:effectRef idx="0">
-          <a:scrgbClr r="0" g="0" b="0"/>
-        </a:effectRef>
-        <a:fontRef idx="minor">
-          <a:schemeClr val="lt1"/>
-        </a:fontRef>
-      </dsp:style>
-      <dsp:txBody>
-        <a:bodyPr spcFirstLastPara="0" vert="horz" wrap="square" lIns="118110" tIns="118110" rIns="118110" bIns="118110" numCol="1" spcCol="1270" anchor="ctr" anchorCtr="0">
-          <a:noAutofit/>
-        </a:bodyPr>
-        <a:lstStyle/>
-        <a:p>
-          <a:pPr lvl="0" algn="ctr" defTabSz="1377950" rtl="0">
-            <a:lnSpc>
-              <a:spcPct val="90000"/>
-            </a:lnSpc>
-            <a:spcBef>
-              <a:spcPct val="0"/>
-            </a:spcBef>
-            <a:spcAft>
-              <a:spcPct val="35000"/>
-            </a:spcAft>
-          </a:pPr>
-          <a:r>
-            <a:rPr lang="en-US" sz="3100" kern="1200" dirty="0"/>
-            <a:t>Early detection of errors</a:t>
-          </a:r>
-        </a:p>
-      </dsp:txBody>
-      <dsp:txXfrm>
-        <a:off x="4400435" y="554552"/>
-        <a:ext cx="3470382" cy="1730289"/>
-      </dsp:txXfrm>
-    </dsp:sp>
-    <dsp:sp modelId="{D8FA9740-E7D0-417F-A47B-796A16B6EAD4}">
-      <dsp:nvSpPr>
-        <dsp:cNvPr id="0" name=""/>
-        <dsp:cNvSpPr/>
-      </dsp:nvSpPr>
-      <dsp:spPr>
-        <a:xfrm>
-          <a:off x="374895" y="2514441"/>
-          <a:ext cx="3657592" cy="1917499"/>
-        </a:xfrm>
-        <a:prstGeom prst="roundRect">
-          <a:avLst/>
-        </a:prstGeom>
-        <a:solidFill>
-          <a:srgbClr val="FF0066"/>
-        </a:solidFill>
-        <a:ln w="12700" cap="flat" cmpd="sng" algn="ctr">
-          <a:solidFill>
-            <a:schemeClr val="lt1">
-              <a:hueOff val="0"/>
-              <a:satOff val="0"/>
-              <a:lumOff val="0"/>
-              <a:alphaOff val="0"/>
-            </a:schemeClr>
-          </a:solidFill>
-          <a:prstDash val="solid"/>
-          <a:miter lim="800000"/>
-        </a:ln>
-        <a:effectLst/>
-      </dsp:spPr>
-      <dsp:style>
-        <a:lnRef idx="2">
-          <a:scrgbClr r="0" g="0" b="0"/>
-        </a:lnRef>
-        <a:fillRef idx="1">
-          <a:scrgbClr r="0" g="0" b="0"/>
-        </a:fillRef>
-        <a:effectRef idx="0">
-          <a:scrgbClr r="0" g="0" b="0"/>
-        </a:effectRef>
-        <a:fontRef idx="minor">
-          <a:schemeClr val="lt1"/>
-        </a:fontRef>
-      </dsp:style>
-      <dsp:txBody>
-        <a:bodyPr spcFirstLastPara="0" vert="horz" wrap="square" lIns="118110" tIns="118110" rIns="118110" bIns="118110" numCol="1" spcCol="1270" anchor="ctr" anchorCtr="0">
-          <a:noAutofit/>
-        </a:bodyPr>
-        <a:lstStyle/>
-        <a:p>
-          <a:pPr lvl="0" algn="ctr" defTabSz="1377950" rtl="0">
-            <a:lnSpc>
-              <a:spcPct val="90000"/>
-            </a:lnSpc>
-            <a:spcBef>
-              <a:spcPct val="0"/>
-            </a:spcBef>
-            <a:spcAft>
-              <a:spcPct val="35000"/>
-            </a:spcAft>
-          </a:pPr>
-          <a:r>
-            <a:rPr lang="en-US" sz="3100" kern="1200" dirty="0"/>
-            <a:t>Better tool support</a:t>
-          </a:r>
-        </a:p>
-      </dsp:txBody>
-      <dsp:txXfrm>
-        <a:off x="468500" y="2608046"/>
-        <a:ext cx="3470382" cy="1730289"/>
-      </dsp:txXfrm>
-    </dsp:sp>
-    <dsp:sp modelId="{D70537A6-6622-4E16-992A-31AB38267826}">
-      <dsp:nvSpPr>
-        <dsp:cNvPr id="0" name=""/>
-        <dsp:cNvSpPr/>
-      </dsp:nvSpPr>
-      <dsp:spPr>
-        <a:xfrm>
-          <a:off x="4306830" y="2514441"/>
-          <a:ext cx="3657592" cy="1917499"/>
-        </a:xfrm>
-        <a:prstGeom prst="roundRect">
-          <a:avLst/>
-        </a:prstGeom>
-        <a:solidFill>
-          <a:schemeClr val="accent4">
-            <a:lumMod val="50000"/>
-          </a:schemeClr>
-        </a:solidFill>
-        <a:ln w="12700" cap="flat" cmpd="sng" algn="ctr">
-          <a:solidFill>
-            <a:schemeClr val="lt1">
-              <a:hueOff val="0"/>
-              <a:satOff val="0"/>
-              <a:lumOff val="0"/>
-              <a:alphaOff val="0"/>
-            </a:schemeClr>
-          </a:solidFill>
-          <a:prstDash val="solid"/>
-          <a:miter lim="800000"/>
-        </a:ln>
-        <a:effectLst/>
-      </dsp:spPr>
-      <dsp:style>
-        <a:lnRef idx="2">
-          <a:scrgbClr r="0" g="0" b="0"/>
-        </a:lnRef>
-        <a:fillRef idx="1">
-          <a:scrgbClr r="0" g="0" b="0"/>
-        </a:fillRef>
-        <a:effectRef idx="0">
-          <a:scrgbClr r="0" g="0" b="0"/>
-        </a:effectRef>
-        <a:fontRef idx="minor">
-          <a:schemeClr val="lt1"/>
-        </a:fontRef>
-      </dsp:style>
-      <dsp:txBody>
-        <a:bodyPr spcFirstLastPara="0" vert="horz" wrap="square" lIns="114300" tIns="114300" rIns="114300" bIns="114300" numCol="1" spcCol="1270" anchor="ctr" anchorCtr="0">
-          <a:noAutofit/>
-        </a:bodyPr>
-        <a:lstStyle/>
-        <a:p>
-          <a:pPr lvl="0" algn="ctr" defTabSz="1333500" rtl="0">
-            <a:lnSpc>
-              <a:spcPct val="90000"/>
-            </a:lnSpc>
-            <a:spcBef>
-              <a:spcPct val="0"/>
-            </a:spcBef>
-            <a:spcAft>
-              <a:spcPct val="35000"/>
-            </a:spcAft>
-          </a:pPr>
-          <a:r>
-            <a:rPr lang="en-US" sz="3000" kern="1200" dirty="0"/>
-            <a:t>Because Microsoft says so</a:t>
-          </a:r>
-        </a:p>
-      </dsp:txBody>
-      <dsp:txXfrm>
-        <a:off x="4400435" y="2608046"/>
-        <a:ext cx="3470382" cy="1730289"/>
-      </dsp:txXfrm>
-    </dsp:sp>
   </dsp:spTree>
 </dsp:drawing>
 </file>
@@ -7123,314 +6341,6 @@
       <dsp:cNvGrpSpPr/>
     </dsp:nvGrpSpPr>
     <dsp:grpSpPr/>
-    <dsp:sp modelId="{A06141EF-D560-4A24-87F8-6F55C23C99B7}">
-      <dsp:nvSpPr>
-        <dsp:cNvPr id="0" name=""/>
-        <dsp:cNvSpPr/>
-      </dsp:nvSpPr>
-      <dsp:spPr>
-        <a:xfrm>
-          <a:off x="1374276" y="779580"/>
-          <a:ext cx="4303775" cy="1310595"/>
-        </a:xfrm>
-        <a:prstGeom prst="roundRect">
-          <a:avLst/>
-        </a:prstGeom>
-        <a:solidFill>
-          <a:schemeClr val="accent1">
-            <a:hueOff val="0"/>
-            <a:satOff val="0"/>
-            <a:lumOff val="0"/>
-            <a:alphaOff val="0"/>
-          </a:schemeClr>
-        </a:solidFill>
-        <a:ln w="12700" cap="flat" cmpd="sng" algn="ctr">
-          <a:solidFill>
-            <a:schemeClr val="lt1">
-              <a:hueOff val="0"/>
-              <a:satOff val="0"/>
-              <a:lumOff val="0"/>
-              <a:alphaOff val="0"/>
-            </a:schemeClr>
-          </a:solidFill>
-          <a:prstDash val="solid"/>
-          <a:miter lim="800000"/>
-        </a:ln>
-        <a:effectLst/>
-      </dsp:spPr>
-      <dsp:style>
-        <a:lnRef idx="2">
-          <a:scrgbClr r="0" g="0" b="0"/>
-        </a:lnRef>
-        <a:fillRef idx="1">
-          <a:scrgbClr r="0" g="0" b="0"/>
-        </a:fillRef>
-        <a:effectRef idx="0">
-          <a:scrgbClr r="0" g="0" b="0"/>
-        </a:effectRef>
-        <a:fontRef idx="minor">
-          <a:schemeClr val="lt1"/>
-        </a:fontRef>
-      </dsp:style>
-      <dsp:txBody>
-        <a:bodyPr spcFirstLastPara="0" vert="horz" wrap="square" lIns="95250" tIns="47625" rIns="95250" bIns="47625" numCol="1" spcCol="1270" anchor="ctr" anchorCtr="0">
-          <a:noAutofit/>
-        </a:bodyPr>
-        <a:lstStyle/>
-        <a:p>
-          <a:pPr lvl="0" algn="ctr" defTabSz="1111250" rtl="0">
-            <a:lnSpc>
-              <a:spcPct val="90000"/>
-            </a:lnSpc>
-            <a:spcBef>
-              <a:spcPct val="0"/>
-            </a:spcBef>
-            <a:spcAft>
-              <a:spcPct val="35000"/>
-            </a:spcAft>
-          </a:pPr>
-          <a:r>
-            <a:rPr lang="en-US" sz="2500" kern="1200" dirty="0"/>
-            <a:t>JavaScript library to simplify CRUD applications</a:t>
-          </a:r>
-        </a:p>
-      </dsp:txBody>
-      <dsp:txXfrm>
-        <a:off x="1438254" y="843558"/>
-        <a:ext cx="4175819" cy="1182639"/>
-      </dsp:txXfrm>
-    </dsp:sp>
-    <dsp:sp modelId="{6987A3D5-F23F-4C71-97FD-C4066B969232}">
-      <dsp:nvSpPr>
-        <dsp:cNvPr id="0" name=""/>
-        <dsp:cNvSpPr/>
-      </dsp:nvSpPr>
-      <dsp:spPr>
-        <a:xfrm>
-          <a:off x="5977466" y="785608"/>
-          <a:ext cx="4303775" cy="1310595"/>
-        </a:xfrm>
-        <a:prstGeom prst="roundRect">
-          <a:avLst/>
-        </a:prstGeom>
-        <a:solidFill>
-          <a:schemeClr val="accent1">
-            <a:hueOff val="0"/>
-            <a:satOff val="0"/>
-            <a:lumOff val="0"/>
-            <a:alphaOff val="0"/>
-          </a:schemeClr>
-        </a:solidFill>
-        <a:ln w="12700" cap="flat" cmpd="sng" algn="ctr">
-          <a:solidFill>
-            <a:schemeClr val="lt1">
-              <a:hueOff val="0"/>
-              <a:satOff val="0"/>
-              <a:lumOff val="0"/>
-              <a:alphaOff val="0"/>
-            </a:schemeClr>
-          </a:solidFill>
-          <a:prstDash val="solid"/>
-          <a:miter lim="800000"/>
-        </a:ln>
-        <a:effectLst/>
-      </dsp:spPr>
-      <dsp:style>
-        <a:lnRef idx="2">
-          <a:scrgbClr r="0" g="0" b="0"/>
-        </a:lnRef>
-        <a:fillRef idx="1">
-          <a:scrgbClr r="0" g="0" b="0"/>
-        </a:fillRef>
-        <a:effectRef idx="0">
-          <a:scrgbClr r="0" g="0" b="0"/>
-        </a:effectRef>
-        <a:fontRef idx="minor">
-          <a:schemeClr val="lt1"/>
-        </a:fontRef>
-      </dsp:style>
-      <dsp:txBody>
-        <a:bodyPr spcFirstLastPara="0" vert="horz" wrap="square" lIns="95250" tIns="47625" rIns="95250" bIns="47625" numCol="1" spcCol="1270" anchor="ctr" anchorCtr="0">
-          <a:noAutofit/>
-        </a:bodyPr>
-        <a:lstStyle/>
-        <a:p>
-          <a:pPr lvl="0" algn="ctr" defTabSz="1111250" rtl="0">
-            <a:lnSpc>
-              <a:spcPct val="90000"/>
-            </a:lnSpc>
-            <a:spcBef>
-              <a:spcPct val="0"/>
-            </a:spcBef>
-            <a:spcAft>
-              <a:spcPct val="35000"/>
-            </a:spcAft>
-          </a:pPr>
-          <a:r>
-            <a:rPr lang="en-US" sz="2500" kern="1200" dirty="0"/>
-            <a:t>Eases the creation of rich and responsive web sites</a:t>
-          </a:r>
-        </a:p>
-      </dsp:txBody>
-      <dsp:txXfrm>
-        <a:off x="6041444" y="849586"/>
-        <a:ext cx="4175819" cy="1182639"/>
-      </dsp:txXfrm>
-    </dsp:sp>
-    <dsp:sp modelId="{4999D31B-B452-463A-ABC3-D972D5D6734A}">
-      <dsp:nvSpPr>
-        <dsp:cNvPr id="0" name=""/>
-        <dsp:cNvSpPr/>
-      </dsp:nvSpPr>
-      <dsp:spPr>
-        <a:xfrm>
-          <a:off x="1335758" y="2571360"/>
-          <a:ext cx="4303775" cy="1310595"/>
-        </a:xfrm>
-        <a:prstGeom prst="roundRect">
-          <a:avLst/>
-        </a:prstGeom>
-        <a:solidFill>
-          <a:schemeClr val="accent1">
-            <a:hueOff val="0"/>
-            <a:satOff val="0"/>
-            <a:lumOff val="0"/>
-            <a:alphaOff val="0"/>
-          </a:schemeClr>
-        </a:solidFill>
-        <a:ln w="12700" cap="flat" cmpd="sng" algn="ctr">
-          <a:solidFill>
-            <a:schemeClr val="lt1">
-              <a:hueOff val="0"/>
-              <a:satOff val="0"/>
-              <a:lumOff val="0"/>
-              <a:alphaOff val="0"/>
-            </a:schemeClr>
-          </a:solidFill>
-          <a:prstDash val="solid"/>
-          <a:miter lim="800000"/>
-        </a:ln>
-        <a:effectLst/>
-      </dsp:spPr>
-      <dsp:style>
-        <a:lnRef idx="2">
-          <a:scrgbClr r="0" g="0" b="0"/>
-        </a:lnRef>
-        <a:fillRef idx="1">
-          <a:scrgbClr r="0" g="0" b="0"/>
-        </a:fillRef>
-        <a:effectRef idx="0">
-          <a:scrgbClr r="0" g="0" b="0"/>
-        </a:effectRef>
-        <a:fontRef idx="minor">
-          <a:schemeClr val="lt1"/>
-        </a:fontRef>
-      </dsp:style>
-      <dsp:txBody>
-        <a:bodyPr spcFirstLastPara="0" vert="horz" wrap="square" lIns="95250" tIns="47625" rIns="95250" bIns="47625" numCol="1" spcCol="1270" anchor="ctr" anchorCtr="0">
-          <a:noAutofit/>
-        </a:bodyPr>
-        <a:lstStyle/>
-        <a:p>
-          <a:pPr lvl="0" algn="ctr" defTabSz="1111250" rtl="0">
-            <a:lnSpc>
-              <a:spcPct val="90000"/>
-            </a:lnSpc>
-            <a:spcBef>
-              <a:spcPct val="0"/>
-            </a:spcBef>
-            <a:spcAft>
-              <a:spcPct val="35000"/>
-            </a:spcAft>
-          </a:pPr>
-          <a:r>
-            <a:rPr lang="en-US" sz="2500" kern="1200" dirty="0"/>
-            <a:t>Provides 2 way databinding between the data and it’s presentation</a:t>
-          </a:r>
-        </a:p>
-      </dsp:txBody>
-      <dsp:txXfrm>
-        <a:off x="1399736" y="2635338"/>
-        <a:ext cx="4175819" cy="1182639"/>
-      </dsp:txXfrm>
-    </dsp:sp>
-    <dsp:sp modelId="{0E1A1D33-51CA-41EE-83DE-AC2EAE45C4A6}">
-      <dsp:nvSpPr>
-        <dsp:cNvPr id="0" name=""/>
-        <dsp:cNvSpPr/>
-      </dsp:nvSpPr>
-      <dsp:spPr>
-        <a:xfrm>
-          <a:off x="5977466" y="2577376"/>
-          <a:ext cx="4303775" cy="1310595"/>
-        </a:xfrm>
-        <a:prstGeom prst="roundRect">
-          <a:avLst/>
-        </a:prstGeom>
-        <a:solidFill>
-          <a:schemeClr val="accent1">
-            <a:hueOff val="0"/>
-            <a:satOff val="0"/>
-            <a:lumOff val="0"/>
-            <a:alphaOff val="0"/>
-          </a:schemeClr>
-        </a:solidFill>
-        <a:ln w="12700" cap="flat" cmpd="sng" algn="ctr">
-          <a:solidFill>
-            <a:schemeClr val="lt1">
-              <a:hueOff val="0"/>
-              <a:satOff val="0"/>
-              <a:lumOff val="0"/>
-              <a:alphaOff val="0"/>
-            </a:schemeClr>
-          </a:solidFill>
-          <a:prstDash val="solid"/>
-          <a:miter lim="800000"/>
-        </a:ln>
-        <a:effectLst/>
-      </dsp:spPr>
-      <dsp:style>
-        <a:lnRef idx="2">
-          <a:scrgbClr r="0" g="0" b="0"/>
-        </a:lnRef>
-        <a:fillRef idx="1">
-          <a:scrgbClr r="0" g="0" b="0"/>
-        </a:fillRef>
-        <a:effectRef idx="0">
-          <a:scrgbClr r="0" g="0" b="0"/>
-        </a:effectRef>
-        <a:fontRef idx="minor">
-          <a:schemeClr val="lt1"/>
-        </a:fontRef>
-      </dsp:style>
-      <dsp:txBody>
-        <a:bodyPr spcFirstLastPara="0" vert="horz" wrap="square" lIns="95250" tIns="47625" rIns="95250" bIns="47625" numCol="1" spcCol="1270" anchor="ctr" anchorCtr="0">
-          <a:noAutofit/>
-        </a:bodyPr>
-        <a:lstStyle/>
-        <a:p>
-          <a:pPr lvl="0" algn="ctr" defTabSz="1111250" rtl="0">
-            <a:lnSpc>
-              <a:spcPct val="90000"/>
-            </a:lnSpc>
-            <a:spcBef>
-              <a:spcPct val="0"/>
-            </a:spcBef>
-            <a:spcAft>
-              <a:spcPct val="35000"/>
-            </a:spcAft>
-          </a:pPr>
-          <a:r>
-            <a:rPr lang="en-US" sz="2500" kern="1200" dirty="0"/>
-            <a:t>Based on the Model View ViewModel (MVVM) pattern</a:t>
-          </a:r>
-        </a:p>
-      </dsp:txBody>
-      <dsp:txXfrm>
-        <a:off x="6041444" y="2641354"/>
-        <a:ext cx="4175819" cy="1182639"/>
-      </dsp:txXfrm>
-    </dsp:sp>
   </dsp:spTree>
 </dsp:drawing>
 </file>
@@ -7443,331 +6353,6 @@
       <dsp:cNvGrpSpPr/>
     </dsp:nvGrpSpPr>
     <dsp:grpSpPr/>
-    <dsp:sp modelId="{E2D29A80-DFF9-42D5-8321-575EC58CC7A6}">
-      <dsp:nvSpPr>
-        <dsp:cNvPr id="0" name=""/>
-        <dsp:cNvSpPr/>
-      </dsp:nvSpPr>
-      <dsp:spPr>
-        <a:xfrm>
-          <a:off x="1671988" y="0"/>
-          <a:ext cx="4916666" cy="4916666"/>
-        </a:xfrm>
-        <a:prstGeom prst="diamond">
-          <a:avLst/>
-        </a:prstGeom>
-        <a:noFill/>
-        <a:ln>
-          <a:noFill/>
-        </a:ln>
-        <a:effectLst/>
-      </dsp:spPr>
-      <dsp:style>
-        <a:lnRef idx="0">
-          <a:scrgbClr r="0" g="0" b="0"/>
-        </a:lnRef>
-        <a:fillRef idx="1">
-          <a:scrgbClr r="0" g="0" b="0"/>
-        </a:fillRef>
-        <a:effectRef idx="0">
-          <a:scrgbClr r="0" g="0" b="0"/>
-        </a:effectRef>
-        <a:fontRef idx="minor"/>
-      </dsp:style>
-    </dsp:sp>
-    <dsp:sp modelId="{C14930DF-CE5D-439B-A21A-A81E31A88005}">
-      <dsp:nvSpPr>
-        <dsp:cNvPr id="0" name=""/>
-        <dsp:cNvSpPr/>
-      </dsp:nvSpPr>
-      <dsp:spPr>
-        <a:xfrm>
-          <a:off x="374895" y="458262"/>
-          <a:ext cx="3657592" cy="1917499"/>
-        </a:xfrm>
-        <a:prstGeom prst="roundRect">
-          <a:avLst/>
-        </a:prstGeom>
-        <a:solidFill>
-          <a:schemeClr val="accent6"/>
-        </a:solidFill>
-        <a:ln w="12700" cap="flat" cmpd="sng" algn="ctr">
-          <a:solidFill>
-            <a:schemeClr val="lt1">
-              <a:hueOff val="0"/>
-              <a:satOff val="0"/>
-              <a:lumOff val="0"/>
-              <a:alphaOff val="0"/>
-            </a:schemeClr>
-          </a:solidFill>
-          <a:prstDash val="solid"/>
-          <a:miter lim="800000"/>
-        </a:ln>
-        <a:effectLst/>
-      </dsp:spPr>
-      <dsp:style>
-        <a:lnRef idx="2">
-          <a:scrgbClr r="0" g="0" b="0"/>
-        </a:lnRef>
-        <a:fillRef idx="1">
-          <a:scrgbClr r="0" g="0" b="0"/>
-        </a:fillRef>
-        <a:effectRef idx="0">
-          <a:scrgbClr r="0" g="0" b="0"/>
-        </a:effectRef>
-        <a:fontRef idx="minor">
-          <a:schemeClr val="lt1"/>
-        </a:fontRef>
-      </dsp:style>
-      <dsp:txBody>
-        <a:bodyPr spcFirstLastPara="0" vert="horz" wrap="square" lIns="102870" tIns="102870" rIns="102870" bIns="102870" numCol="1" spcCol="1270" anchor="ctr" anchorCtr="0">
-          <a:noAutofit/>
-        </a:bodyPr>
-        <a:lstStyle/>
-        <a:p>
-          <a:pPr lvl="0" algn="ctr" defTabSz="1200150" rtl="0">
-            <a:lnSpc>
-              <a:spcPct val="90000"/>
-            </a:lnSpc>
-            <a:spcBef>
-              <a:spcPct val="0"/>
-            </a:spcBef>
-            <a:spcAft>
-              <a:spcPct val="35000"/>
-            </a:spcAft>
-          </a:pPr>
-          <a:r>
-            <a:rPr lang="en-US" sz="2700" kern="1200" dirty="0"/>
-            <a:t>Um…really?</a:t>
-          </a:r>
-        </a:p>
-      </dsp:txBody>
-      <dsp:txXfrm>
-        <a:off x="468500" y="551867"/>
-        <a:ext cx="3470382" cy="1730289"/>
-      </dsp:txXfrm>
-    </dsp:sp>
-    <dsp:sp modelId="{DC38BAFD-3BF8-4B40-8F7A-81DAB0CC4FB6}">
-      <dsp:nvSpPr>
-        <dsp:cNvPr id="0" name=""/>
-        <dsp:cNvSpPr/>
-      </dsp:nvSpPr>
-      <dsp:spPr>
-        <a:xfrm>
-          <a:off x="4306830" y="460947"/>
-          <a:ext cx="3657592" cy="1917499"/>
-        </a:xfrm>
-        <a:prstGeom prst="roundRect">
-          <a:avLst/>
-        </a:prstGeom>
-        <a:solidFill>
-          <a:schemeClr val="accent1">
-            <a:lumMod val="60000"/>
-            <a:lumOff val="40000"/>
-          </a:schemeClr>
-        </a:solidFill>
-        <a:ln w="12700" cap="flat" cmpd="sng" algn="ctr">
-          <a:solidFill>
-            <a:schemeClr val="lt1">
-              <a:hueOff val="0"/>
-              <a:satOff val="0"/>
-              <a:lumOff val="0"/>
-              <a:alphaOff val="0"/>
-            </a:schemeClr>
-          </a:solidFill>
-          <a:prstDash val="solid"/>
-          <a:miter lim="800000"/>
-        </a:ln>
-        <a:effectLst/>
-      </dsp:spPr>
-      <dsp:style>
-        <a:lnRef idx="2">
-          <a:scrgbClr r="0" g="0" b="0"/>
-        </a:lnRef>
-        <a:fillRef idx="1">
-          <a:scrgbClr r="0" g="0" b="0"/>
-        </a:fillRef>
-        <a:effectRef idx="0">
-          <a:scrgbClr r="0" g="0" b="0"/>
-        </a:effectRef>
-        <a:fontRef idx="minor">
-          <a:schemeClr val="lt1"/>
-        </a:fontRef>
-      </dsp:style>
-      <dsp:txBody>
-        <a:bodyPr spcFirstLastPara="0" vert="horz" wrap="square" lIns="99060" tIns="99060" rIns="99060" bIns="99060" numCol="1" spcCol="1270" anchor="ctr" anchorCtr="0">
-          <a:noAutofit/>
-        </a:bodyPr>
-        <a:lstStyle/>
-        <a:p>
-          <a:pPr lvl="0" algn="ctr" defTabSz="1155700" rtl="0">
-            <a:lnSpc>
-              <a:spcPct val="90000"/>
-            </a:lnSpc>
-            <a:spcBef>
-              <a:spcPct val="0"/>
-            </a:spcBef>
-            <a:spcAft>
-              <a:spcPct val="35000"/>
-            </a:spcAft>
-          </a:pPr>
-          <a:r>
-            <a:rPr lang="en-US" sz="2600" kern="1200" dirty="0"/>
-            <a:t>Most SharePoint Customizations are CRUD applications</a:t>
-          </a:r>
-        </a:p>
-      </dsp:txBody>
-      <dsp:txXfrm>
-        <a:off x="4400435" y="554552"/>
-        <a:ext cx="3470382" cy="1730289"/>
-      </dsp:txXfrm>
-    </dsp:sp>
-    <dsp:sp modelId="{D8FA9740-E7D0-417F-A47B-796A16B6EAD4}">
-      <dsp:nvSpPr>
-        <dsp:cNvPr id="0" name=""/>
-        <dsp:cNvSpPr/>
-      </dsp:nvSpPr>
-      <dsp:spPr>
-        <a:xfrm>
-          <a:off x="374895" y="2514441"/>
-          <a:ext cx="3657592" cy="1917499"/>
-        </a:xfrm>
-        <a:prstGeom prst="roundRect">
-          <a:avLst/>
-        </a:prstGeom>
-        <a:solidFill>
-          <a:srgbClr val="FF0066"/>
-        </a:solidFill>
-        <a:ln w="12700" cap="flat" cmpd="sng" algn="ctr">
-          <a:solidFill>
-            <a:schemeClr val="lt1">
-              <a:hueOff val="0"/>
-              <a:satOff val="0"/>
-              <a:lumOff val="0"/>
-              <a:alphaOff val="0"/>
-            </a:schemeClr>
-          </a:solidFill>
-          <a:prstDash val="solid"/>
-          <a:miter lim="800000"/>
-        </a:ln>
-        <a:effectLst/>
-      </dsp:spPr>
-      <dsp:style>
-        <a:lnRef idx="2">
-          <a:scrgbClr r="0" g="0" b="0"/>
-        </a:lnRef>
-        <a:fillRef idx="1">
-          <a:scrgbClr r="0" g="0" b="0"/>
-        </a:fillRef>
-        <a:effectRef idx="0">
-          <a:scrgbClr r="0" g="0" b="0"/>
-        </a:effectRef>
-        <a:fontRef idx="minor">
-          <a:schemeClr val="lt1"/>
-        </a:fontRef>
-      </dsp:style>
-      <dsp:txBody>
-        <a:bodyPr spcFirstLastPara="0" vert="horz" wrap="square" lIns="95250" tIns="95250" rIns="95250" bIns="95250" numCol="1" spcCol="1270" anchor="ctr" anchorCtr="0">
-          <a:noAutofit/>
-        </a:bodyPr>
-        <a:lstStyle/>
-        <a:p>
-          <a:pPr lvl="0" algn="ctr" defTabSz="1111250" rtl="0">
-            <a:lnSpc>
-              <a:spcPct val="90000"/>
-            </a:lnSpc>
-            <a:spcBef>
-              <a:spcPct val="0"/>
-            </a:spcBef>
-            <a:spcAft>
-              <a:spcPct val="35000"/>
-            </a:spcAft>
-          </a:pPr>
-          <a:r>
-            <a:rPr lang="en-US" sz="2500" kern="1200" dirty="0"/>
-            <a:t>CRUD is mostly boiler plate HTML and JavaScript</a:t>
-          </a:r>
-        </a:p>
-      </dsp:txBody>
-      <dsp:txXfrm>
-        <a:off x="468500" y="2608046"/>
-        <a:ext cx="3470382" cy="1730289"/>
-      </dsp:txXfrm>
-    </dsp:sp>
-    <dsp:sp modelId="{D70537A6-6622-4E16-992A-31AB38267826}">
-      <dsp:nvSpPr>
-        <dsp:cNvPr id="0" name=""/>
-        <dsp:cNvSpPr/>
-      </dsp:nvSpPr>
-      <dsp:spPr>
-        <a:xfrm>
-          <a:off x="4306830" y="2514441"/>
-          <a:ext cx="3657592" cy="1917499"/>
-        </a:xfrm>
-        <a:prstGeom prst="roundRect">
-          <a:avLst/>
-        </a:prstGeom>
-        <a:solidFill>
-          <a:schemeClr val="accent4">
-            <a:lumMod val="50000"/>
-          </a:schemeClr>
-        </a:solidFill>
-        <a:ln w="12700" cap="flat" cmpd="sng" algn="ctr">
-          <a:solidFill>
-            <a:schemeClr val="lt1">
-              <a:hueOff val="0"/>
-              <a:satOff val="0"/>
-              <a:lumOff val="0"/>
-              <a:alphaOff val="0"/>
-            </a:schemeClr>
-          </a:solidFill>
-          <a:prstDash val="solid"/>
-          <a:miter lim="800000"/>
-        </a:ln>
-        <a:effectLst/>
-      </dsp:spPr>
-      <dsp:style>
-        <a:lnRef idx="2">
-          <a:scrgbClr r="0" g="0" b="0"/>
-        </a:lnRef>
-        <a:fillRef idx="1">
-          <a:scrgbClr r="0" g="0" b="0"/>
-        </a:fillRef>
-        <a:effectRef idx="0">
-          <a:scrgbClr r="0" g="0" b="0"/>
-        </a:effectRef>
-        <a:fontRef idx="minor">
-          <a:schemeClr val="lt1"/>
-        </a:fontRef>
-      </dsp:style>
-      <dsp:txBody>
-        <a:bodyPr spcFirstLastPara="0" vert="horz" wrap="square" lIns="95250" tIns="95250" rIns="95250" bIns="95250" numCol="1" spcCol="1270" anchor="ctr" anchorCtr="0">
-          <a:noAutofit/>
-        </a:bodyPr>
-        <a:lstStyle/>
-        <a:p>
-          <a:pPr lvl="0" algn="ctr" defTabSz="1111250" rtl="0">
-            <a:lnSpc>
-              <a:spcPct val="90000"/>
-            </a:lnSpc>
-            <a:spcBef>
-              <a:spcPct val="0"/>
-            </a:spcBef>
-            <a:spcAft>
-              <a:spcPct val="35000"/>
-            </a:spcAft>
-          </a:pPr>
-          <a:r>
-            <a:rPr lang="en-US" sz="2500" kern="1200" dirty="0"/>
-            <a:t>Knockout helps separate concerns and minimizes boiler plate code and markup</a:t>
-          </a:r>
-        </a:p>
-      </dsp:txBody>
-      <dsp:txXfrm>
-        <a:off x="4400435" y="2608046"/>
-        <a:ext cx="3470382" cy="1730289"/>
-      </dsp:txXfrm>
-    </dsp:sp>
   </dsp:spTree>
 </dsp:drawing>
 </file>
@@ -7780,314 +6365,6 @@
       <dsp:cNvGrpSpPr/>
     </dsp:nvGrpSpPr>
     <dsp:grpSpPr/>
-    <dsp:sp modelId="{A8DF4B1C-4053-48A7-9B84-4338E57AD5CF}">
-      <dsp:nvSpPr>
-        <dsp:cNvPr id="0" name=""/>
-        <dsp:cNvSpPr/>
-      </dsp:nvSpPr>
-      <dsp:spPr>
-        <a:xfrm>
-          <a:off x="3364992" y="2183"/>
-          <a:ext cx="3785616" cy="1050223"/>
-        </a:xfrm>
-        <a:prstGeom prst="roundRect">
-          <a:avLst/>
-        </a:prstGeom>
-        <a:solidFill>
-          <a:schemeClr val="accent1">
-            <a:hueOff val="0"/>
-            <a:satOff val="0"/>
-            <a:lumOff val="0"/>
-            <a:alphaOff val="0"/>
-          </a:schemeClr>
-        </a:solidFill>
-        <a:ln w="12700" cap="flat" cmpd="sng" algn="ctr">
-          <a:solidFill>
-            <a:schemeClr val="lt1">
-              <a:hueOff val="0"/>
-              <a:satOff val="0"/>
-              <a:lumOff val="0"/>
-              <a:alphaOff val="0"/>
-            </a:schemeClr>
-          </a:solidFill>
-          <a:prstDash val="solid"/>
-          <a:miter lim="800000"/>
-        </a:ln>
-        <a:effectLst/>
-      </dsp:spPr>
-      <dsp:style>
-        <a:lnRef idx="2">
-          <a:scrgbClr r="0" g="0" b="0"/>
-        </a:lnRef>
-        <a:fillRef idx="1">
-          <a:scrgbClr r="0" g="0" b="0"/>
-        </a:fillRef>
-        <a:effectRef idx="0">
-          <a:scrgbClr r="0" g="0" b="0"/>
-        </a:effectRef>
-        <a:fontRef idx="minor">
-          <a:schemeClr val="lt1"/>
-        </a:fontRef>
-      </dsp:style>
-      <dsp:txBody>
-        <a:bodyPr spcFirstLastPara="0" vert="horz" wrap="square" lIns="144780" tIns="72390" rIns="144780" bIns="72390" numCol="1" spcCol="1270" anchor="ctr" anchorCtr="0">
-          <a:noAutofit/>
-        </a:bodyPr>
-        <a:lstStyle/>
-        <a:p>
-          <a:pPr lvl="0" algn="ctr" defTabSz="1689100">
-            <a:lnSpc>
-              <a:spcPct val="90000"/>
-            </a:lnSpc>
-            <a:spcBef>
-              <a:spcPct val="0"/>
-            </a:spcBef>
-            <a:spcAft>
-              <a:spcPct val="35000"/>
-            </a:spcAft>
-          </a:pPr>
-          <a:r>
-            <a:rPr lang="en-US" sz="3800" kern="1200" dirty="0"/>
-            <a:t>POJO</a:t>
-          </a:r>
-        </a:p>
-      </dsp:txBody>
-      <dsp:txXfrm>
-        <a:off x="3416260" y="53451"/>
-        <a:ext cx="3683080" cy="947687"/>
-      </dsp:txXfrm>
-    </dsp:sp>
-    <dsp:sp modelId="{3CEF0401-9E65-4842-B2DB-939F5A9F66A8}">
-      <dsp:nvSpPr>
-        <dsp:cNvPr id="0" name=""/>
-        <dsp:cNvSpPr/>
-      </dsp:nvSpPr>
-      <dsp:spPr>
-        <a:xfrm>
-          <a:off x="3364992" y="1104917"/>
-          <a:ext cx="3785616" cy="1050223"/>
-        </a:xfrm>
-        <a:prstGeom prst="roundRect">
-          <a:avLst/>
-        </a:prstGeom>
-        <a:solidFill>
-          <a:schemeClr val="accent1">
-            <a:hueOff val="0"/>
-            <a:satOff val="0"/>
-            <a:lumOff val="0"/>
-            <a:alphaOff val="0"/>
-          </a:schemeClr>
-        </a:solidFill>
-        <a:ln w="12700" cap="flat" cmpd="sng" algn="ctr">
-          <a:solidFill>
-            <a:schemeClr val="lt1">
-              <a:hueOff val="0"/>
-              <a:satOff val="0"/>
-              <a:lumOff val="0"/>
-              <a:alphaOff val="0"/>
-            </a:schemeClr>
-          </a:solidFill>
-          <a:prstDash val="solid"/>
-          <a:miter lim="800000"/>
-        </a:ln>
-        <a:effectLst/>
-      </dsp:spPr>
-      <dsp:style>
-        <a:lnRef idx="2">
-          <a:scrgbClr r="0" g="0" b="0"/>
-        </a:lnRef>
-        <a:fillRef idx="1">
-          <a:scrgbClr r="0" g="0" b="0"/>
-        </a:fillRef>
-        <a:effectRef idx="0">
-          <a:scrgbClr r="0" g="0" b="0"/>
-        </a:effectRef>
-        <a:fontRef idx="minor">
-          <a:schemeClr val="lt1"/>
-        </a:fontRef>
-      </dsp:style>
-      <dsp:txBody>
-        <a:bodyPr spcFirstLastPara="0" vert="horz" wrap="square" lIns="144780" tIns="72390" rIns="144780" bIns="72390" numCol="1" spcCol="1270" anchor="ctr" anchorCtr="0">
-          <a:noAutofit/>
-        </a:bodyPr>
-        <a:lstStyle/>
-        <a:p>
-          <a:pPr lvl="0" algn="ctr" defTabSz="1689100">
-            <a:lnSpc>
-              <a:spcPct val="90000"/>
-            </a:lnSpc>
-            <a:spcBef>
-              <a:spcPct val="0"/>
-            </a:spcBef>
-            <a:spcAft>
-              <a:spcPct val="35000"/>
-            </a:spcAft>
-          </a:pPr>
-          <a:r>
-            <a:rPr lang="en-US" sz="3800" kern="1200" dirty="0"/>
-            <a:t>Observable</a:t>
-          </a:r>
-        </a:p>
-      </dsp:txBody>
-      <dsp:txXfrm>
-        <a:off x="3416260" y="1156185"/>
-        <a:ext cx="3683080" cy="947687"/>
-      </dsp:txXfrm>
-    </dsp:sp>
-    <dsp:sp modelId="{B93882A3-6F74-47CE-B702-F959B885BC40}">
-      <dsp:nvSpPr>
-        <dsp:cNvPr id="0" name=""/>
-        <dsp:cNvSpPr/>
-      </dsp:nvSpPr>
-      <dsp:spPr>
-        <a:xfrm>
-          <a:off x="3364992" y="2207652"/>
-          <a:ext cx="3785616" cy="1050223"/>
-        </a:xfrm>
-        <a:prstGeom prst="roundRect">
-          <a:avLst/>
-        </a:prstGeom>
-        <a:solidFill>
-          <a:schemeClr val="accent1">
-            <a:hueOff val="0"/>
-            <a:satOff val="0"/>
-            <a:lumOff val="0"/>
-            <a:alphaOff val="0"/>
-          </a:schemeClr>
-        </a:solidFill>
-        <a:ln w="12700" cap="flat" cmpd="sng" algn="ctr">
-          <a:solidFill>
-            <a:schemeClr val="lt1">
-              <a:hueOff val="0"/>
-              <a:satOff val="0"/>
-              <a:lumOff val="0"/>
-              <a:alphaOff val="0"/>
-            </a:schemeClr>
-          </a:solidFill>
-          <a:prstDash val="solid"/>
-          <a:miter lim="800000"/>
-        </a:ln>
-        <a:effectLst/>
-      </dsp:spPr>
-      <dsp:style>
-        <a:lnRef idx="2">
-          <a:scrgbClr r="0" g="0" b="0"/>
-        </a:lnRef>
-        <a:fillRef idx="1">
-          <a:scrgbClr r="0" g="0" b="0"/>
-        </a:fillRef>
-        <a:effectRef idx="0">
-          <a:scrgbClr r="0" g="0" b="0"/>
-        </a:effectRef>
-        <a:fontRef idx="minor">
-          <a:schemeClr val="lt1"/>
-        </a:fontRef>
-      </dsp:style>
-      <dsp:txBody>
-        <a:bodyPr spcFirstLastPara="0" vert="horz" wrap="square" lIns="144780" tIns="72390" rIns="144780" bIns="72390" numCol="1" spcCol="1270" anchor="ctr" anchorCtr="0">
-          <a:noAutofit/>
-        </a:bodyPr>
-        <a:lstStyle/>
-        <a:p>
-          <a:pPr lvl="0" algn="ctr" defTabSz="1689100">
-            <a:lnSpc>
-              <a:spcPct val="90000"/>
-            </a:lnSpc>
-            <a:spcBef>
-              <a:spcPct val="0"/>
-            </a:spcBef>
-            <a:spcAft>
-              <a:spcPct val="35000"/>
-            </a:spcAft>
-          </a:pPr>
-          <a:r>
-            <a:rPr lang="en-US" sz="3800" kern="1200" dirty="0"/>
-            <a:t>Observable Array</a:t>
-          </a:r>
-        </a:p>
-      </dsp:txBody>
-      <dsp:txXfrm>
-        <a:off x="3416260" y="2258920"/>
-        <a:ext cx="3683080" cy="947687"/>
-      </dsp:txXfrm>
-    </dsp:sp>
-    <dsp:sp modelId="{FD3875B4-3BFB-422B-90BA-FCCC6138EB35}">
-      <dsp:nvSpPr>
-        <dsp:cNvPr id="0" name=""/>
-        <dsp:cNvSpPr/>
-      </dsp:nvSpPr>
-      <dsp:spPr>
-        <a:xfrm>
-          <a:off x="3364992" y="3310386"/>
-          <a:ext cx="3785616" cy="1050223"/>
-        </a:xfrm>
-        <a:prstGeom prst="roundRect">
-          <a:avLst/>
-        </a:prstGeom>
-        <a:solidFill>
-          <a:schemeClr val="accent1">
-            <a:hueOff val="0"/>
-            <a:satOff val="0"/>
-            <a:lumOff val="0"/>
-            <a:alphaOff val="0"/>
-          </a:schemeClr>
-        </a:solidFill>
-        <a:ln w="12700" cap="flat" cmpd="sng" algn="ctr">
-          <a:solidFill>
-            <a:schemeClr val="lt1">
-              <a:hueOff val="0"/>
-              <a:satOff val="0"/>
-              <a:lumOff val="0"/>
-              <a:alphaOff val="0"/>
-            </a:schemeClr>
-          </a:solidFill>
-          <a:prstDash val="solid"/>
-          <a:miter lim="800000"/>
-        </a:ln>
-        <a:effectLst/>
-      </dsp:spPr>
-      <dsp:style>
-        <a:lnRef idx="2">
-          <a:scrgbClr r="0" g="0" b="0"/>
-        </a:lnRef>
-        <a:fillRef idx="1">
-          <a:scrgbClr r="0" g="0" b="0"/>
-        </a:fillRef>
-        <a:effectRef idx="0">
-          <a:scrgbClr r="0" g="0" b="0"/>
-        </a:effectRef>
-        <a:fontRef idx="minor">
-          <a:schemeClr val="lt1"/>
-        </a:fontRef>
-      </dsp:style>
-      <dsp:txBody>
-        <a:bodyPr spcFirstLastPara="0" vert="horz" wrap="square" lIns="144780" tIns="72390" rIns="144780" bIns="72390" numCol="1" spcCol="1270" anchor="ctr" anchorCtr="0">
-          <a:noAutofit/>
-        </a:bodyPr>
-        <a:lstStyle/>
-        <a:p>
-          <a:pPr lvl="0" algn="ctr" defTabSz="1689100">
-            <a:lnSpc>
-              <a:spcPct val="90000"/>
-            </a:lnSpc>
-            <a:spcBef>
-              <a:spcPct val="0"/>
-            </a:spcBef>
-            <a:spcAft>
-              <a:spcPct val="35000"/>
-            </a:spcAft>
-          </a:pPr>
-          <a:r>
-            <a:rPr lang="en-US" sz="3800" kern="1200" dirty="0"/>
-            <a:t>Event</a:t>
-          </a:r>
-        </a:p>
-      </dsp:txBody>
-      <dsp:txXfrm>
-        <a:off x="3416260" y="3361654"/>
-        <a:ext cx="3683080" cy="947687"/>
-      </dsp:txXfrm>
-    </dsp:sp>
   </dsp:spTree>
 </dsp:drawing>
 </file>
@@ -15682,7 +13959,7 @@
           <a:p>
             <a:fld id="{90103BBB-E53D-4293-9149-0B0062B986F7}" type="datetimeFigureOut">
               <a:rPr lang="en-US" smtClean="0"/>
-              <a:t>11/18/2017</a:t>
+              <a:t>6/17/2018</a:t>
             </a:fld>
             <a:endParaRPr lang="en-US" dirty="0"/>
           </a:p>
@@ -16176,7 +14453,7 @@
           <a:p>
             <a:fld id="{83B5B94A-D4C6-4252-9821-CF0A721D5EBA}" type="datetimeFigureOut">
               <a:rPr lang="en-US" smtClean="0"/>
-              <a:t>11/18/2017</a:t>
+              <a:t>6/17/2018</a:t>
             </a:fld>
             <a:endParaRPr lang="en-US" dirty="0"/>
           </a:p>
@@ -16351,7 +14628,7 @@
           <a:p>
             <a:fld id="{83B5B94A-D4C6-4252-9821-CF0A721D5EBA}" type="datetimeFigureOut">
               <a:rPr lang="en-US" smtClean="0"/>
-              <a:t>11/18/2017</a:t>
+              <a:t>6/17/2018</a:t>
             </a:fld>
             <a:endParaRPr lang="en-US" dirty="0"/>
           </a:p>
@@ -16529,7 +14806,7 @@
           <a:p>
             <a:fld id="{83B5B94A-D4C6-4252-9821-CF0A721D5EBA}" type="datetimeFigureOut">
               <a:rPr lang="en-US" smtClean="0"/>
-              <a:t>11/18/2017</a:t>
+              <a:t>6/17/2018</a:t>
             </a:fld>
             <a:endParaRPr lang="en-US" dirty="0"/>
           </a:p>
@@ -16728,7 +15005,7 @@
           <a:p>
             <a:fld id="{63FEFF52-9460-4099-90BA-627469BA87D4}" type="datetimeFigureOut">
               <a:rPr lang="en-US" smtClean="0"/>
-              <a:t>11/18/2017</a:t>
+              <a:t>6/17/2018</a:t>
             </a:fld>
             <a:endParaRPr lang="en-US" dirty="0"/>
           </a:p>
@@ -16898,7 +15175,7 @@
           <a:p>
             <a:fld id="{63FEFF52-9460-4099-90BA-627469BA87D4}" type="datetimeFigureOut">
               <a:rPr lang="en-US" smtClean="0"/>
-              <a:t>11/18/2017</a:t>
+              <a:t>6/17/2018</a:t>
             </a:fld>
             <a:endParaRPr lang="en-US" dirty="0"/>
           </a:p>
@@ -17151,7 +15428,7 @@
           <a:p>
             <a:fld id="{63FEFF52-9460-4099-90BA-627469BA87D4}" type="datetimeFigureOut">
               <a:rPr lang="en-US" smtClean="0"/>
-              <a:t>11/18/2017</a:t>
+              <a:t>6/17/2018</a:t>
             </a:fld>
             <a:endParaRPr lang="en-US" dirty="0"/>
           </a:p>
@@ -17383,7 +15660,7 @@
           <a:p>
             <a:fld id="{63FEFF52-9460-4099-90BA-627469BA87D4}" type="datetimeFigureOut">
               <a:rPr lang="en-US" smtClean="0"/>
-              <a:t>11/18/2017</a:t>
+              <a:t>6/17/2018</a:t>
             </a:fld>
             <a:endParaRPr lang="en-US" dirty="0"/>
           </a:p>
@@ -17750,7 +16027,7 @@
           <a:p>
             <a:fld id="{63FEFF52-9460-4099-90BA-627469BA87D4}" type="datetimeFigureOut">
               <a:rPr lang="en-US" smtClean="0"/>
-              <a:t>11/18/2017</a:t>
+              <a:t>6/17/2018</a:t>
             </a:fld>
             <a:endParaRPr lang="en-US" dirty="0"/>
           </a:p>
@@ -17868,7 +16145,7 @@
           <a:p>
             <a:fld id="{63FEFF52-9460-4099-90BA-627469BA87D4}" type="datetimeFigureOut">
               <a:rPr lang="en-US" smtClean="0"/>
-              <a:t>11/18/2017</a:t>
+              <a:t>6/17/2018</a:t>
             </a:fld>
             <a:endParaRPr lang="en-US" dirty="0"/>
           </a:p>
@@ -17963,7 +16240,7 @@
           <a:p>
             <a:fld id="{63FEFF52-9460-4099-90BA-627469BA87D4}" type="datetimeFigureOut">
               <a:rPr lang="en-US" smtClean="0"/>
-              <a:t>11/18/2017</a:t>
+              <a:t>6/17/2018</a:t>
             </a:fld>
             <a:endParaRPr lang="en-US" dirty="0"/>
           </a:p>
@@ -18240,7 +16517,7 @@
           <a:p>
             <a:fld id="{63FEFF52-9460-4099-90BA-627469BA87D4}" type="datetimeFigureOut">
               <a:rPr lang="en-US" smtClean="0"/>
-              <a:t>11/18/2017</a:t>
+              <a:t>6/17/2018</a:t>
             </a:fld>
             <a:endParaRPr lang="en-US" dirty="0"/>
           </a:p>
@@ -18408,7 +16685,7 @@
           <a:p>
             <a:fld id="{83B5B94A-D4C6-4252-9821-CF0A721D5EBA}" type="datetimeFigureOut">
               <a:rPr lang="en-US" smtClean="0"/>
-              <a:t>11/18/2017</a:t>
+              <a:t>6/17/2018</a:t>
             </a:fld>
             <a:endParaRPr lang="en-US" dirty="0"/>
           </a:p>
@@ -18668,7 +16945,7 @@
           <a:p>
             <a:fld id="{63FEFF52-9460-4099-90BA-627469BA87D4}" type="datetimeFigureOut">
               <a:rPr lang="en-US" smtClean="0"/>
-              <a:t>11/18/2017</a:t>
+              <a:t>6/17/2018</a:t>
             </a:fld>
             <a:endParaRPr lang="en-US" dirty="0"/>
           </a:p>
@@ -18838,7 +17115,7 @@
           <a:p>
             <a:fld id="{63FEFF52-9460-4099-90BA-627469BA87D4}" type="datetimeFigureOut">
               <a:rPr lang="en-US" smtClean="0"/>
-              <a:t>11/18/2017</a:t>
+              <a:t>6/17/2018</a:t>
             </a:fld>
             <a:endParaRPr lang="en-US" dirty="0"/>
           </a:p>
@@ -19018,7 +17295,7 @@
           <a:p>
             <a:fld id="{63FEFF52-9460-4099-90BA-627469BA87D4}" type="datetimeFigureOut">
               <a:rPr lang="en-US" smtClean="0"/>
-              <a:t>11/18/2017</a:t>
+              <a:t>6/17/2018</a:t>
             </a:fld>
             <a:endParaRPr lang="en-US" dirty="0"/>
           </a:p>
@@ -19633,7 +17910,7 @@
           <a:p>
             <a:fld id="{83B5B94A-D4C6-4252-9821-CF0A721D5EBA}" type="datetimeFigureOut">
               <a:rPr lang="en-US" smtClean="0"/>
-              <a:t>11/18/2017</a:t>
+              <a:t>6/17/2018</a:t>
             </a:fld>
             <a:endParaRPr lang="en-US" dirty="0"/>
           </a:p>
@@ -19862,7 +18139,7 @@
           <a:p>
             <a:fld id="{83B5B94A-D4C6-4252-9821-CF0A721D5EBA}" type="datetimeFigureOut">
               <a:rPr lang="en-US" smtClean="0"/>
-              <a:t>11/18/2017</a:t>
+              <a:t>6/17/2018</a:t>
             </a:fld>
             <a:endParaRPr lang="en-US" dirty="0"/>
           </a:p>
@@ -20226,7 +18503,7 @@
           <a:p>
             <a:fld id="{83B5B94A-D4C6-4252-9821-CF0A721D5EBA}" type="datetimeFigureOut">
               <a:rPr lang="en-US" smtClean="0"/>
-              <a:t>11/18/2017</a:t>
+              <a:t>6/17/2018</a:t>
             </a:fld>
             <a:endParaRPr lang="en-US" dirty="0"/>
           </a:p>
@@ -20343,7 +18620,7 @@
           <a:p>
             <a:fld id="{83B5B94A-D4C6-4252-9821-CF0A721D5EBA}" type="datetimeFigureOut">
               <a:rPr lang="en-US" smtClean="0"/>
-              <a:t>11/18/2017</a:t>
+              <a:t>6/17/2018</a:t>
             </a:fld>
             <a:endParaRPr lang="en-US" dirty="0"/>
           </a:p>
@@ -20438,7 +18715,7 @@
           <a:p>
             <a:fld id="{83B5B94A-D4C6-4252-9821-CF0A721D5EBA}" type="datetimeFigureOut">
               <a:rPr lang="en-US" smtClean="0"/>
-              <a:t>11/18/2017</a:t>
+              <a:t>6/17/2018</a:t>
             </a:fld>
             <a:endParaRPr lang="en-US" dirty="0"/>
           </a:p>
@@ -20713,7 +18990,7 @@
           <a:p>
             <a:fld id="{83B5B94A-D4C6-4252-9821-CF0A721D5EBA}" type="datetimeFigureOut">
               <a:rPr lang="en-US" smtClean="0"/>
-              <a:t>11/18/2017</a:t>
+              <a:t>6/17/2018</a:t>
             </a:fld>
             <a:endParaRPr lang="en-US" dirty="0"/>
           </a:p>
@@ -20965,7 +19242,7 @@
           <a:p>
             <a:fld id="{83B5B94A-D4C6-4252-9821-CF0A721D5EBA}" type="datetimeFigureOut">
               <a:rPr lang="en-US" smtClean="0"/>
-              <a:t>11/18/2017</a:t>
+              <a:t>6/17/2018</a:t>
             </a:fld>
             <a:endParaRPr lang="en-US" dirty="0"/>
           </a:p>
@@ -21185,7 +19462,7 @@
           <a:p>
             <a:fld id="{83B5B94A-D4C6-4252-9821-CF0A721D5EBA}" type="datetimeFigureOut">
               <a:rPr lang="en-US" smtClean="0"/>
-              <a:t>11/18/2017</a:t>
+              <a:t>6/17/2018</a:t>
             </a:fld>
             <a:endParaRPr lang="en-US" dirty="0"/>
           </a:p>
@@ -21274,7 +19551,7 @@
           <p:cNvPr id="9" name="Rectangle 8">
             <a:extLst>
               <a:ext uri="{FF2B5EF4-FFF2-40B4-BE49-F238E27FC236}">
-                <a16:creationId xmlns="" xmlns:a16="http://schemas.microsoft.com/office/drawing/2014/main" id="{92427E23-DE61-4FAD-B8A3-961B404CEC03}"/>
+                <a16:creationId xmlns:a16="http://schemas.microsoft.com/office/drawing/2014/main" xmlns="" id="{92427E23-DE61-4FAD-B8A3-961B404CEC03}"/>
               </a:ext>
             </a:extLst>
           </p:cNvPr>
@@ -21842,7 +20119,7 @@
           <a:p>
             <a:fld id="{63FEFF52-9460-4099-90BA-627469BA87D4}" type="datetimeFigureOut">
               <a:rPr lang="en-US" smtClean="0"/>
-              <a:t>11/18/2017</a:t>
+              <a:t>6/17/2018</a:t>
             </a:fld>
             <a:endParaRPr lang="en-US" dirty="0"/>
           </a:p>
@@ -24708,7 +22985,23 @@
             </a:pPr>
             <a:r>
               <a:rPr lang="en-US" sz="2000" dirty="0"/>
-              <a:t>&lt;site&gt;/_vti_bin/exportwp.aspx? pageurl=&lt;pageurl&gt;&amp;guidstring=&lt;webPartId&gt;</a:t>
+              <a:t>&lt;site&gt;/_</a:t>
+            </a:r>
+            <a:r>
+              <a:rPr lang="en-US" sz="2000" dirty="0" err="1" smtClean="0"/>
+              <a:t>vti_bin</a:t>
+            </a:r>
+            <a:r>
+              <a:rPr lang="en-US" sz="2000" dirty="0" smtClean="0"/>
+              <a:t>/</a:t>
+            </a:r>
+            <a:r>
+              <a:rPr lang="en-US" sz="2000" dirty="0" err="1" smtClean="0"/>
+              <a:t>exportwp.aspx?pageurl</a:t>
+            </a:r>
+            <a:r>
+              <a:rPr lang="en-US" sz="2000" dirty="0"/>
+              <a:t>=&lt;pageurl&gt;&amp;guidstring=&lt;webPartId&gt;</a:t>
             </a:r>
           </a:p>
           <a:p>
@@ -27327,6 +25620,15 @@
 </file>
 
 <file path=customXml/item1.xml><?xml version="1.0" encoding="utf-8"?>
+<?mso-contentType ?>
+<FormTemplates xmlns="http://schemas.microsoft.com/sharepoint/v3/contenttype/forms">
+  <Display>DocumentLibraryForm</Display>
+  <Edit>DocumentLibraryForm</Edit>
+  <New>DocumentLibraryForm</New>
+</FormTemplates>
+</file>
+
+<file path=customXml/item2.xml><?xml version="1.0" encoding="utf-8"?>
 <ct:contentTypeSchema xmlns:ct="http://schemas.microsoft.com/office/2006/metadata/contentType" xmlns:ma="http://schemas.microsoft.com/office/2006/metadata/properties/metaAttributes" ct:_="" ma:_="" ma:contentTypeName="Unknown Document Type" ma:contentTypeID="0x010104" ma:contentTypeVersion="0" ma:contentTypeDescription="" ma:contentTypeScope="" ma:versionID="05d83ceaa0bbd2e3bc716e6e66bd857a">
   <xsd:schema xmlns:xsd="http://www.w3.org/2001/XMLSchema" xmlns:xs="http://www.w3.org/2001/XMLSchema" xmlns:p="http://schemas.microsoft.com/office/2006/metadata/properties" targetNamespace="http://schemas.microsoft.com/office/2006/metadata/properties" ma:root="true" ma:fieldsID="b3d69fe45253d5ff147bb69036b756a7">
     <xsd:element name="properties">
@@ -27440,15 +25742,6 @@
 </ct:contentTypeSchema>
 </file>
 
-<file path=customXml/item2.xml><?xml version="1.0" encoding="utf-8"?>
-<?mso-contentType ?>
-<FormTemplates xmlns="http://schemas.microsoft.com/sharepoint/v3/contenttype/forms">
-  <Display>DocumentLibraryForm</Display>
-  <Edit>DocumentLibraryForm</Edit>
-  <New>DocumentLibraryForm</New>
-</FormTemplates>
-</file>
-
 <file path=customXml/item3.xml><?xml version="1.0" encoding="utf-8"?>
 <p:properties xmlns:p="http://schemas.microsoft.com/office/2006/metadata/properties" xmlns:xsi="http://www.w3.org/2001/XMLSchema-instance" xmlns:pc="http://schemas.microsoft.com/office/infopath/2007/PartnerControls">
   <documentManagement/>
@@ -27456,6 +25749,14 @@
 </file>
 
 <file path=customXml/itemProps1.xml><?xml version="1.0" encoding="utf-8"?>
+<ds:datastoreItem xmlns:ds="http://schemas.openxmlformats.org/officeDocument/2006/customXml" ds:itemID="{BD3838D6-D387-47DB-98DE-E6AD820770DE}">
+  <ds:schemaRefs>
+    <ds:schemaRef ds:uri="http://schemas.microsoft.com/sharepoint/v3/contenttype/forms"/>
+  </ds:schemaRefs>
+</ds:datastoreItem>
+</file>
+
+<file path=customXml/itemProps2.xml><?xml version="1.0" encoding="utf-8"?>
 <ds:datastoreItem xmlns:ds="http://schemas.openxmlformats.org/officeDocument/2006/customXml" ds:itemID="{25DF74AC-AFCB-44E7-907E-698D70C63A06}">
   <ds:schemaRefs>
     <ds:schemaRef ds:uri="http://schemas.microsoft.com/office/2006/metadata/contentType"/>
@@ -27467,14 +25768,6 @@
     <ds:schemaRef ds:uri="http://purl.org/dc/terms/"/>
     <ds:schemaRef ds:uri="http://schemas.microsoft.com/internal/obd"/>
     <ds:schemaRef ds:uri="http://schemas.microsoft.com/office/infopath/2007/PartnerControls"/>
-  </ds:schemaRefs>
-</ds:datastoreItem>
-</file>
-
-<file path=customXml/itemProps2.xml><?xml version="1.0" encoding="utf-8"?>
-<ds:datastoreItem xmlns:ds="http://schemas.openxmlformats.org/officeDocument/2006/customXml" ds:itemID="{BD3838D6-D387-47DB-98DE-E6AD820770DE}">
-  <ds:schemaRefs>
-    <ds:schemaRef ds:uri="http://schemas.microsoft.com/sharepoint/v3/contenttype/forms"/>
   </ds:schemaRefs>
 </ds:datastoreItem>
 </file>

</xml_diff>